<commit_message>
* fixing sequence diagram
</commit_message>
<xml_diff>
--- a/doc/task07/cs1_task07_System-Model.pptx
+++ b/doc/task07/cs1_task07_System-Model.pptx
@@ -5812,7 +5812,7 @@
       </p:sp>
       <p:pic>
         <p:nvPicPr>
-          <p:cNvPr id="3" name="Picture 2"/>
+          <p:cNvPr id="2" name="Picture 1"/>
           <p:cNvPicPr>
             <a:picLocks noChangeAspect="1"/>
           </p:cNvPicPr>
@@ -5832,8 +5832,8 @@
         </p:blipFill>
         <p:spPr>
           <a:xfrm>
-            <a:off x="2345323" y="1498419"/>
-            <a:ext cx="7500394" cy="5151786"/>
+            <a:off x="2162710" y="1416270"/>
+            <a:ext cx="7386644" cy="5073654"/>
           </a:xfrm>
           <a:prstGeom prst="rect">
             <a:avLst/>

</xml_diff>